<commit_message>
Adding final report and last comparison slide to presentation
</commit_message>
<xml_diff>
--- a/Presentations/ProjectPresentation_04-27-JM.pptx
+++ b/Presentations/ProjectPresentation_04-27-JM.pptx
@@ -16,7 +16,8 @@
     <p:sldId id="355" r:id="rId10"/>
     <p:sldId id="358" r:id="rId11"/>
     <p:sldId id="359" r:id="rId12"/>
-    <p:sldId id="334" r:id="rId13"/>
+    <p:sldId id="363" r:id="rId13"/>
+    <p:sldId id="334" r:id="rId14"/>
   </p:sldIdLst>
   <p:sldSz cx="12192000" cy="6858000"/>
   <p:notesSz cx="6858000" cy="9144000"/>
@@ -4915,8 +4916,8 @@
           </a:p>
         </p:txBody>
       </p:sp>
-      <mc:AlternateContent xmlns:mc="http://schemas.openxmlformats.org/markup-compatibility/2006">
-        <mc:Choice xmlns:a14="http://schemas.microsoft.com/office/drawing/2010/main" Requires="a14">
+      <mc:AlternateContent xmlns:mc="http://schemas.openxmlformats.org/markup-compatibility/2006" xmlns:a14="http://schemas.microsoft.com/office/drawing/2010/main">
+        <mc:Choice Requires="a14">
           <p:sp>
             <p:nvSpPr>
               <p:cNvPr id="3" name="Content Placeholder 2">
@@ -5153,7 +5154,7 @@
             </p:txBody>
           </p:sp>
         </mc:Choice>
-        <mc:Fallback>
+        <mc:Fallback xmlns="">
           <p:sp>
             <p:nvSpPr>
               <p:cNvPr id="3" name="Content Placeholder 2">
@@ -5211,6 +5212,133 @@
 </file>
 
 <file path=ppt/slides/slide12.xml><?xml version="1.0" encoding="utf-8"?>
+<p:sld xmlns:a="http://schemas.openxmlformats.org/drawingml/2006/main" xmlns:r="http://schemas.openxmlformats.org/officeDocument/2006/relationships" xmlns:p="http://schemas.openxmlformats.org/presentationml/2006/main">
+  <p:cSld>
+    <p:spTree>
+      <p:nvGrpSpPr>
+        <p:cNvPr id="1" name=""/>
+        <p:cNvGrpSpPr/>
+        <p:nvPr/>
+      </p:nvGrpSpPr>
+      <p:grpSpPr>
+        <a:xfrm>
+          <a:off x="0" y="0"/>
+          <a:ext cx="0" cy="0"/>
+          <a:chOff x="0" y="0"/>
+          <a:chExt cx="0" cy="0"/>
+        </a:xfrm>
+      </p:grpSpPr>
+      <p:sp>
+        <p:nvSpPr>
+          <p:cNvPr id="2" name="Title 1">
+            <a:extLst>
+              <a:ext uri="{FF2B5EF4-FFF2-40B4-BE49-F238E27FC236}">
+                <a16:creationId xmlns:a16="http://schemas.microsoft.com/office/drawing/2014/main" id="{BBFFCFBD-10F3-A942-97D6-A91A58E96A53}"/>
+              </a:ext>
+            </a:extLst>
+          </p:cNvPr>
+          <p:cNvSpPr>
+            <a:spLocks noGrp="1"/>
+          </p:cNvSpPr>
+          <p:nvPr>
+            <p:ph type="title"/>
+          </p:nvPr>
+        </p:nvSpPr>
+        <p:spPr/>
+        <p:txBody>
+          <a:bodyPr/>
+          <a:lstStyle/>
+          <a:p>
+            <a:r>
+              <a:rPr lang="en-US" dirty="0"/>
+              <a:t>Simulation Results - Comparisons</a:t>
+            </a:r>
+          </a:p>
+        </p:txBody>
+      </p:sp>
+      <p:sp>
+        <p:nvSpPr>
+          <p:cNvPr id="3" name="Content Placeholder 2">
+            <a:extLst>
+              <a:ext uri="{FF2B5EF4-FFF2-40B4-BE49-F238E27FC236}">
+                <a16:creationId xmlns:a16="http://schemas.microsoft.com/office/drawing/2014/main" id="{8B5CE503-65D2-434B-B746-E03119BAFA7F}"/>
+              </a:ext>
+            </a:extLst>
+          </p:cNvPr>
+          <p:cNvSpPr>
+            <a:spLocks noGrp="1"/>
+          </p:cNvSpPr>
+          <p:nvPr>
+            <p:ph idx="1"/>
+          </p:nvPr>
+        </p:nvSpPr>
+        <p:spPr>
+          <a:xfrm>
+            <a:off x="2904565" y="1825625"/>
+            <a:ext cx="8449235" cy="4808088"/>
+          </a:xfrm>
+        </p:spPr>
+        <p:txBody>
+          <a:bodyPr>
+            <a:normAutofit/>
+          </a:bodyPr>
+          <a:lstStyle/>
+          <a:p>
+            <a:r>
+              <a:rPr lang="en-US" dirty="0"/>
+              <a:t>SoC: ~12,500 samples/second</a:t>
+            </a:r>
+          </a:p>
+          <a:p>
+            <a:r>
+              <a:rPr lang="en-US" dirty="0"/>
+              <a:t>FPGA: ~66,000,000 samples/second</a:t>
+            </a:r>
+          </a:p>
+          <a:p>
+            <a:pPr lvl="1"/>
+            <a:r>
+              <a:rPr lang="en-US" dirty="0"/>
+              <a:t>Simulated 100% accuracy, but implementation suffered</a:t>
+            </a:r>
+          </a:p>
+          <a:p>
+            <a:r>
+              <a:rPr lang="en-US" dirty="0" err="1"/>
+              <a:t>FeFET</a:t>
+            </a:r>
+            <a:r>
+              <a:rPr lang="en-US" dirty="0"/>
+              <a:t>: ~416,667 samples/second</a:t>
+            </a:r>
+          </a:p>
+          <a:p>
+            <a:pPr lvl="1"/>
+            <a:r>
+              <a:rPr lang="en-US" dirty="0"/>
+              <a:t>Simulated ~99% accuracy, but implementation suffered</a:t>
+            </a:r>
+          </a:p>
+          <a:p>
+            <a:pPr lvl="1"/>
+            <a:endParaRPr lang="en-US" dirty="0"/>
+          </a:p>
+        </p:txBody>
+      </p:sp>
+    </p:spTree>
+    <p:extLst>
+      <p:ext uri="{BB962C8B-B14F-4D97-AF65-F5344CB8AC3E}">
+        <p14:creationId xmlns:p14="http://schemas.microsoft.com/office/powerpoint/2010/main" val="426622350"/>
+      </p:ext>
+    </p:extLst>
+  </p:cSld>
+  <p:clrMapOvr>
+    <a:masterClrMapping/>
+  </p:clrMapOvr>
+</p:sld>
+</file>
+
+<file path=ppt/slides/slide13.xml><?xml version="1.0" encoding="utf-8"?>
 <p:sld xmlns:a="http://schemas.openxmlformats.org/drawingml/2006/main" xmlns:r="http://schemas.openxmlformats.org/officeDocument/2006/relationships" xmlns:p="http://schemas.openxmlformats.org/presentationml/2006/main">
   <p:cSld>
     <p:spTree>

</xml_diff>